<commit_message>
Commiting the updated files
</commit_message>
<xml_diff>
--- a/Data science PPT_final.pptx
+++ b/Data science PPT_final.pptx
@@ -5,10 +5,10 @@
     <p:sldMasterId id="2147483720" r:id="rId3"/>
   </p:sldMasterIdLst>
   <p:notesMasterIdLst>
-    <p:notesMasterId r:id="rId20"/>
+    <p:notesMasterId r:id="rId21"/>
   </p:notesMasterIdLst>
   <p:handoutMasterIdLst>
-    <p:handoutMasterId r:id="rId21"/>
+    <p:handoutMasterId r:id="rId22"/>
   </p:handoutMasterIdLst>
   <p:sldIdLst>
     <p:sldId id="1593" r:id="rId4"/>
@@ -24,9 +24,10 @@
     <p:sldId id="1605" r:id="rId14"/>
     <p:sldId id="1608" r:id="rId15"/>
     <p:sldId id="1610" r:id="rId16"/>
-    <p:sldId id="1607" r:id="rId17"/>
-    <p:sldId id="1606" r:id="rId18"/>
-    <p:sldId id="1609" r:id="rId19"/>
+    <p:sldId id="1612" r:id="rId17"/>
+    <p:sldId id="1607" r:id="rId18"/>
+    <p:sldId id="1606" r:id="rId19"/>
+    <p:sldId id="1609" r:id="rId20"/>
   </p:sldIdLst>
   <p:sldSz cx="12192000" cy="6858000"/>
   <p:notesSz cx="6858000" cy="9144000"/>
@@ -238,7 +239,7 @@
           <a:p>
             <a:fld id="{91D0B005-AE3F-4DA2-9559-980D1360C114}" type="datetimeFigureOut">
               <a:rPr lang="en-SG" smtClean="0"/>
-              <a:t>3/12/24</a:t>
+              <a:t>4/12/24</a:t>
             </a:fld>
             <a:endParaRPr lang="en-SG"/>
           </a:p>
@@ -415,7 +416,7 @@
           <a:p>
             <a:fld id="{AEA0547B-158A-49BE-8714-80B0BEEFC392}" type="datetimeFigureOut">
               <a:rPr lang="en-SG" smtClean="0"/>
-              <a:t>3/12/24</a:t>
+              <a:t>4/12/24</a:t>
             </a:fld>
             <a:endParaRPr lang="en-SG"/>
           </a:p>
@@ -6385,6 +6386,36 @@
           </a:p>
         </p:txBody>
       </p:sp>
+      <p:pic>
+        <p:nvPicPr>
+          <p:cNvPr id="7" name="Picture 6">
+            <a:extLst>
+              <a:ext uri="{FF2B5EF4-FFF2-40B4-BE49-F238E27FC236}">
+                <a16:creationId xmlns:a16="http://schemas.microsoft.com/office/drawing/2014/main" id="{44BC86BA-952E-5AF7-C5A8-A74FC050BA15}"/>
+              </a:ext>
+            </a:extLst>
+          </p:cNvPr>
+          <p:cNvPicPr>
+            <a:picLocks noChangeAspect="1"/>
+          </p:cNvPicPr>
+          <p:nvPr/>
+        </p:nvPicPr>
+        <p:blipFill>
+          <a:blip r:embed="rId2"/>
+          <a:stretch>
+            <a:fillRect/>
+          </a:stretch>
+        </p:blipFill>
+        <p:spPr>
+          <a:xfrm>
+            <a:off x="4332890" y="4875809"/>
+            <a:ext cx="7772400" cy="1857058"/>
+          </a:xfrm>
+          <a:prstGeom prst="rect">
+            <a:avLst/>
+          </a:prstGeom>
+        </p:spPr>
+      </p:pic>
     </p:spTree>
     <p:extLst>
       <p:ext uri="{BB962C8B-B14F-4D97-AF65-F5344CB8AC3E}">
@@ -6735,7 +6766,7 @@
           <p:cNvPr id="2" name="Title 1">
             <a:extLst>
               <a:ext uri="{FF2B5EF4-FFF2-40B4-BE49-F238E27FC236}">
-                <a16:creationId xmlns:a16="http://schemas.microsoft.com/office/drawing/2014/main" id="{74734AB3-1765-EFB5-2992-9E04B479D4BB}"/>
+                <a16:creationId xmlns:a16="http://schemas.microsoft.com/office/drawing/2014/main" id="{6081EB48-38DB-291F-9607-819C8DE89D58}"/>
               </a:ext>
             </a:extLst>
           </p:cNvPr>
@@ -6748,321 +6779,57 @@
         </p:nvSpPr>
         <p:spPr/>
         <p:txBody>
-          <a:bodyPr>
-            <a:normAutofit/>
-          </a:bodyPr>
+          <a:bodyPr/>
           <a:lstStyle/>
           <a:p>
             <a:r>
-              <a:rPr lang="en-US" sz="2800" b="1" dirty="0"/>
-              <a:t>Model Training and Optimization</a:t>
-            </a:r>
-          </a:p>
-        </p:txBody>
-      </p:sp>
-      <p:sp>
-        <p:nvSpPr>
-          <p:cNvPr id="3" name="Content Placeholder 2">
+              <a:rPr lang="en-US" dirty="0"/>
+              <a:t>Average review score per state</a:t>
+            </a:r>
+          </a:p>
+        </p:txBody>
+      </p:sp>
+      <p:pic>
+        <p:nvPicPr>
+          <p:cNvPr id="7" name="Content Placeholder 6" descr="A screen shot of a graph&#10;&#10;Description automatically generated">
             <a:extLst>
               <a:ext uri="{FF2B5EF4-FFF2-40B4-BE49-F238E27FC236}">
-                <a16:creationId xmlns:a16="http://schemas.microsoft.com/office/drawing/2014/main" id="{C02FC2E7-1895-8423-971F-470D327A126B}"/>
+                <a16:creationId xmlns:a16="http://schemas.microsoft.com/office/drawing/2014/main" id="{1ABADDA1-DD47-36C2-2EC9-975600D6C1BA}"/>
               </a:ext>
             </a:extLst>
           </p:cNvPr>
-          <p:cNvSpPr>
-            <a:spLocks noGrp="1"/>
-          </p:cNvSpPr>
+          <p:cNvPicPr>
+            <a:picLocks noGrp="1" noChangeAspect="1"/>
+          </p:cNvPicPr>
           <p:nvPr>
             <p:ph idx="1"/>
           </p:nvPr>
-        </p:nvSpPr>
+        </p:nvPicPr>
+        <p:blipFill>
+          <a:blip r:embed="rId2">
+            <a:extLst>
+              <a:ext uri="{28A0092B-C50C-407E-A947-70E740481C1C}">
+                <a14:useLocalDpi xmlns:a14="http://schemas.microsoft.com/office/drawing/2010/main" val="0"/>
+              </a:ext>
+            </a:extLst>
+          </a:blip>
+          <a:stretch>
+            <a:fillRect/>
+          </a:stretch>
+        </p:blipFill>
         <p:spPr>
           <a:xfrm>
-            <a:off x="4800602" y="731519"/>
-            <a:ext cx="6492240" cy="5728265"/>
+            <a:off x="542925" y="1707865"/>
+            <a:ext cx="10892861" cy="4729896"/>
           </a:xfrm>
         </p:spPr>
-        <p:txBody>
-          <a:bodyPr/>
-          <a:lstStyle/>
-          <a:p>
-            <a:pPr marL="0" indent="0">
-              <a:buNone/>
-            </a:pPr>
-            <a:r>
-              <a:rPr lang="en-US" sz="1800" dirty="0">
-                <a:solidFill>
-                  <a:schemeClr val="tx1"/>
-                </a:solidFill>
-              </a:rPr>
-              <a:t>This is a classification problem so we used following models to predict customer satisfaction:</a:t>
-            </a:r>
-          </a:p>
-          <a:p>
-            <a:r>
-              <a:rPr lang="en-IN" sz="1800" dirty="0">
-                <a:solidFill>
-                  <a:schemeClr val="tx1"/>
-                </a:solidFill>
-                <a:effectLst/>
-                <a:latin typeface="Helvetica" pitchFamily="2" charset="0"/>
-              </a:rPr>
-              <a:t>Logistic regression</a:t>
-            </a:r>
-          </a:p>
-          <a:p>
-            <a:r>
-              <a:rPr lang="en-IN" sz="1800" dirty="0">
-                <a:solidFill>
-                  <a:schemeClr val="tx1"/>
-                </a:solidFill>
-                <a:effectLst/>
-                <a:latin typeface="Helvetica" pitchFamily="2" charset="0"/>
-              </a:rPr>
-              <a:t>Decision tree classifier</a:t>
-            </a:r>
-          </a:p>
-          <a:p>
-            <a:r>
-              <a:rPr lang="en-IN" sz="1800" dirty="0">
-                <a:solidFill>
-                  <a:schemeClr val="tx1"/>
-                </a:solidFill>
-                <a:effectLst/>
-                <a:latin typeface="Helvetica" pitchFamily="2" charset="0"/>
-              </a:rPr>
-              <a:t>Random forest classifier</a:t>
-            </a:r>
-          </a:p>
-          <a:p>
-            <a:r>
-              <a:rPr lang="en-IN" sz="1800" dirty="0">
-                <a:solidFill>
-                  <a:schemeClr val="tx1"/>
-                </a:solidFill>
-                <a:effectLst/>
-                <a:latin typeface="Helvetica" pitchFamily="2" charset="0"/>
-              </a:rPr>
-              <a:t>Gradient boosted classifier</a:t>
-            </a:r>
-          </a:p>
-          <a:p>
-            <a:pPr marL="0" indent="0">
-              <a:buNone/>
-            </a:pPr>
-            <a:r>
-              <a:rPr lang="en-US" sz="1800" dirty="0">
-                <a:solidFill>
-                  <a:schemeClr val="tx1"/>
-                </a:solidFill>
-              </a:rPr>
-              <a:t>Out of this </a:t>
-            </a:r>
-            <a:r>
-              <a:rPr lang="en-IN" sz="1800" b="1" dirty="0" err="1">
-                <a:solidFill>
-                  <a:schemeClr val="tx1"/>
-                </a:solidFill>
-              </a:rPr>
-              <a:t>HistGradientBoostingClassifier</a:t>
-            </a:r>
-            <a:r>
-              <a:rPr lang="en-IN" sz="1800" b="1" dirty="0">
-                <a:solidFill>
-                  <a:schemeClr val="tx1"/>
-                </a:solidFill>
-              </a:rPr>
-              <a:t> </a:t>
-            </a:r>
-            <a:r>
-              <a:rPr lang="en-IN" sz="1800" dirty="0">
-                <a:solidFill>
-                  <a:schemeClr val="tx1"/>
-                </a:solidFill>
-              </a:rPr>
-              <a:t>was used as it gave us better performance compared to other algorithms. The dataset was split into training and test sets (80%-20%).</a:t>
-            </a:r>
-          </a:p>
-          <a:p>
-            <a:pPr marL="0" indent="0">
-              <a:buNone/>
-            </a:pPr>
-            <a:r>
-              <a:rPr lang="en-IN" sz="1800" b="1" dirty="0" err="1">
-                <a:solidFill>
-                  <a:schemeClr val="tx1"/>
-                </a:solidFill>
-              </a:rPr>
-              <a:t>GridSearchCV</a:t>
-            </a:r>
-            <a:r>
-              <a:rPr lang="en-IN" sz="1800" dirty="0">
-                <a:solidFill>
-                  <a:schemeClr val="tx1"/>
-                </a:solidFill>
-              </a:rPr>
-              <a:t> was used for hyperparameter tuning with the following parameters:</a:t>
-            </a:r>
-          </a:p>
-          <a:p>
-            <a:pPr>
-              <a:lnSpc>
-                <a:spcPts val="1350"/>
-              </a:lnSpc>
-            </a:pPr>
-            <a:r>
-              <a:rPr lang="en-IN" sz="1800" b="0" dirty="0">
-                <a:solidFill>
-                  <a:schemeClr val="tx1"/>
-                </a:solidFill>
-                <a:effectLst/>
-                <a:latin typeface="Menlo" panose="020B0609030804020204" pitchFamily="49" charset="0"/>
-              </a:rPr>
-              <a:t>'</a:t>
-            </a:r>
-            <a:r>
-              <a:rPr lang="en-IN" sz="1800" b="0" dirty="0" err="1">
-                <a:solidFill>
-                  <a:schemeClr val="tx1"/>
-                </a:solidFill>
-                <a:effectLst/>
-                <a:latin typeface="Menlo" panose="020B0609030804020204" pitchFamily="49" charset="0"/>
-              </a:rPr>
-              <a:t>max_iter</a:t>
-            </a:r>
-            <a:r>
-              <a:rPr lang="en-IN" sz="1800" b="0" dirty="0">
-                <a:solidFill>
-                  <a:schemeClr val="tx1"/>
-                </a:solidFill>
-                <a:effectLst/>
-                <a:latin typeface="Menlo" panose="020B0609030804020204" pitchFamily="49" charset="0"/>
-              </a:rPr>
-              <a:t>': [100, 200, 300],</a:t>
-            </a:r>
-          </a:p>
-          <a:p>
-            <a:pPr>
-              <a:lnSpc>
-                <a:spcPts val="1350"/>
-              </a:lnSpc>
-            </a:pPr>
-            <a:r>
-              <a:rPr lang="en-IN" sz="1800" b="0" dirty="0">
-                <a:solidFill>
-                  <a:schemeClr val="tx1"/>
-                </a:solidFill>
-                <a:effectLst/>
-                <a:latin typeface="Menlo" panose="020B0609030804020204" pitchFamily="49" charset="0"/>
-              </a:rPr>
-              <a:t>'</a:t>
-            </a:r>
-            <a:r>
-              <a:rPr lang="en-IN" sz="1800" b="0" dirty="0" err="1">
-                <a:solidFill>
-                  <a:schemeClr val="tx1"/>
-                </a:solidFill>
-                <a:effectLst/>
-                <a:latin typeface="Menlo" panose="020B0609030804020204" pitchFamily="49" charset="0"/>
-              </a:rPr>
-              <a:t>max_depth</a:t>
-            </a:r>
-            <a:r>
-              <a:rPr lang="en-IN" sz="1800" b="0" dirty="0">
-                <a:solidFill>
-                  <a:schemeClr val="tx1"/>
-                </a:solidFill>
-                <a:effectLst/>
-                <a:latin typeface="Menlo" panose="020B0609030804020204" pitchFamily="49" charset="0"/>
-              </a:rPr>
-              <a:t>': [None, 3, 5],</a:t>
-            </a:r>
-          </a:p>
-          <a:p>
-            <a:pPr>
-              <a:lnSpc>
-                <a:spcPts val="1350"/>
-              </a:lnSpc>
-            </a:pPr>
-            <a:r>
-              <a:rPr lang="en-IN" sz="1800" b="0" dirty="0">
-                <a:solidFill>
-                  <a:schemeClr val="tx1"/>
-                </a:solidFill>
-                <a:effectLst/>
-                <a:latin typeface="Menlo" panose="020B0609030804020204" pitchFamily="49" charset="0"/>
-              </a:rPr>
-              <a:t>'</a:t>
-            </a:r>
-            <a:r>
-              <a:rPr lang="en-IN" sz="1800" b="0" dirty="0" err="1">
-                <a:solidFill>
-                  <a:schemeClr val="tx1"/>
-                </a:solidFill>
-                <a:effectLst/>
-                <a:latin typeface="Menlo" panose="020B0609030804020204" pitchFamily="49" charset="0"/>
-              </a:rPr>
-              <a:t>learning_rate</a:t>
-            </a:r>
-            <a:r>
-              <a:rPr lang="en-IN" sz="1800" b="0" dirty="0">
-                <a:solidFill>
-                  <a:schemeClr val="tx1"/>
-                </a:solidFill>
-                <a:effectLst/>
-                <a:latin typeface="Menlo" panose="020B0609030804020204" pitchFamily="49" charset="0"/>
-              </a:rPr>
-              <a:t>': [0.01, 0.1, 0.2],</a:t>
-            </a:r>
-          </a:p>
-          <a:p>
-            <a:pPr>
-              <a:lnSpc>
-                <a:spcPts val="1350"/>
-              </a:lnSpc>
-            </a:pPr>
-            <a:r>
-              <a:rPr lang="en-IN" sz="1800" b="0" dirty="0">
-                <a:solidFill>
-                  <a:schemeClr val="tx1"/>
-                </a:solidFill>
-                <a:effectLst/>
-                <a:latin typeface="Menlo" panose="020B0609030804020204" pitchFamily="49" charset="0"/>
-              </a:rPr>
-              <a:t>'</a:t>
-            </a:r>
-            <a:r>
-              <a:rPr lang="en-IN" sz="1800" b="0" dirty="0" err="1">
-                <a:solidFill>
-                  <a:schemeClr val="tx1"/>
-                </a:solidFill>
-                <a:effectLst/>
-                <a:latin typeface="Menlo" panose="020B0609030804020204" pitchFamily="49" charset="0"/>
-              </a:rPr>
-              <a:t>min_samples_leaf</a:t>
-            </a:r>
-            <a:r>
-              <a:rPr lang="en-IN" sz="1800" b="0" dirty="0">
-                <a:solidFill>
-                  <a:schemeClr val="tx1"/>
-                </a:solidFill>
-                <a:effectLst/>
-                <a:latin typeface="Menlo" panose="020B0609030804020204" pitchFamily="49" charset="0"/>
-              </a:rPr>
-              <a:t>': [10, 20, 30]</a:t>
-            </a:r>
-          </a:p>
-          <a:p>
-            <a:endParaRPr lang="en-IN" b="1" dirty="0"/>
-          </a:p>
-        </p:txBody>
-      </p:sp>
-      <p:sp>
-        <p:nvSpPr>
-          <p:cNvPr id="4" name="Text Placeholder 3">
+      </p:pic>
+      <p:sp>
+        <p:nvSpPr>
+          <p:cNvPr id="4" name="Footer Placeholder 3">
             <a:extLst>
               <a:ext uri="{FF2B5EF4-FFF2-40B4-BE49-F238E27FC236}">
-                <a16:creationId xmlns:a16="http://schemas.microsoft.com/office/drawing/2014/main" id="{C16AE560-1342-670A-C212-22E649C83E55}"/>
+                <a16:creationId xmlns:a16="http://schemas.microsoft.com/office/drawing/2014/main" id="{43E3E289-9D85-546A-7C5E-D41BEC99C2C4}"/>
               </a:ext>
             </a:extLst>
           </p:cNvPr>
@@ -7070,7 +6837,7 @@
             <a:spLocks noGrp="1"/>
           </p:cNvSpPr>
           <p:nvPr>
-            <p:ph type="body" sz="half" idx="2"/>
+            <p:ph type="ftr" sz="quarter" idx="11"/>
           </p:nvPr>
         </p:nvSpPr>
         <p:spPr/>
@@ -7078,45 +6845,20 @@
           <a:bodyPr/>
           <a:lstStyle/>
           <a:p>
-            <a:endParaRPr lang="en-US"/>
-          </a:p>
-        </p:txBody>
-      </p:sp>
-      <p:sp>
-        <p:nvSpPr>
-          <p:cNvPr id="5" name="Footer Placeholder 4">
+            <a:r>
+              <a:rPr lang="it-IT"/>
+              <a:t>DA 204o: Data Science in Practice</a:t>
+            </a:r>
+            <a:endParaRPr lang="en-SG"/>
+          </a:p>
+        </p:txBody>
+      </p:sp>
+      <p:sp>
+        <p:nvSpPr>
+          <p:cNvPr id="5" name="Slide Number Placeholder 4">
             <a:extLst>
               <a:ext uri="{FF2B5EF4-FFF2-40B4-BE49-F238E27FC236}">
-                <a16:creationId xmlns:a16="http://schemas.microsoft.com/office/drawing/2014/main" id="{DD5F15AA-0C5B-F22D-F82E-5B57F368B2D1}"/>
-              </a:ext>
-            </a:extLst>
-          </p:cNvPr>
-          <p:cNvSpPr>
-            <a:spLocks noGrp="1"/>
-          </p:cNvSpPr>
-          <p:nvPr>
-            <p:ph type="ftr" sz="quarter" idx="11"/>
-          </p:nvPr>
-        </p:nvSpPr>
-        <p:spPr/>
-        <p:txBody>
-          <a:bodyPr/>
-          <a:lstStyle/>
-          <a:p>
-            <a:r>
-              <a:rPr lang="it-IT"/>
-              <a:t>DA 204o: Data Science in Practice</a:t>
-            </a:r>
-            <a:endParaRPr lang="en-SG"/>
-          </a:p>
-        </p:txBody>
-      </p:sp>
-      <p:sp>
-        <p:nvSpPr>
-          <p:cNvPr id="6" name="Slide Number Placeholder 5">
-            <a:extLst>
-              <a:ext uri="{FF2B5EF4-FFF2-40B4-BE49-F238E27FC236}">
-                <a16:creationId xmlns:a16="http://schemas.microsoft.com/office/drawing/2014/main" id="{93270C39-5227-8F72-675E-8ECBAD471268}"/>
+                <a16:creationId xmlns:a16="http://schemas.microsoft.com/office/drawing/2014/main" id="{EAC7EC84-4B6F-F3B2-259C-E3C6AE4456C4}"/>
               </a:ext>
             </a:extLst>
           </p:cNvPr>
@@ -7143,7 +6885,7 @@
     </p:spTree>
     <p:extLst>
       <p:ext uri="{BB962C8B-B14F-4D97-AF65-F5344CB8AC3E}">
-        <p14:creationId xmlns:p14="http://schemas.microsoft.com/office/powerpoint/2010/main" val="2551012301"/>
+        <p14:creationId xmlns:p14="http://schemas.microsoft.com/office/powerpoint/2010/main" val="460304577"/>
       </p:ext>
     </p:extLst>
   </p:cSld>
@@ -7175,7 +6917,7 @@
           <p:cNvPr id="2" name="Title 1">
             <a:extLst>
               <a:ext uri="{FF2B5EF4-FFF2-40B4-BE49-F238E27FC236}">
-                <a16:creationId xmlns:a16="http://schemas.microsoft.com/office/drawing/2014/main" id="{47685888-ED76-7388-7A16-FB43ED69BC16}"/>
+                <a16:creationId xmlns:a16="http://schemas.microsoft.com/office/drawing/2014/main" id="{74734AB3-1765-EFB5-2992-9E04B479D4BB}"/>
               </a:ext>
             </a:extLst>
           </p:cNvPr>
@@ -7195,7 +6937,7 @@
           <a:p>
             <a:r>
               <a:rPr lang="en-US" sz="2800" b="1" dirty="0"/>
-              <a:t>Results</a:t>
+              <a:t>Model Training and Optimization</a:t>
             </a:r>
           </a:p>
         </p:txBody>
@@ -7205,7 +6947,7 @@
           <p:cNvPr id="3" name="Content Placeholder 2">
             <a:extLst>
               <a:ext uri="{FF2B5EF4-FFF2-40B4-BE49-F238E27FC236}">
-                <a16:creationId xmlns:a16="http://schemas.microsoft.com/office/drawing/2014/main" id="{BA6CECB8-4AE5-4D2C-48CA-E5216457D569}"/>
+                <a16:creationId xmlns:a16="http://schemas.microsoft.com/office/drawing/2014/main" id="{C02FC2E7-1895-8423-971F-470D327A126B}"/>
               </a:ext>
             </a:extLst>
           </p:cNvPr>
@@ -7216,20 +6958,26 @@
             <p:ph idx="1"/>
           </p:nvPr>
         </p:nvSpPr>
-        <p:spPr/>
-        <p:txBody>
-          <a:bodyPr>
-            <a:normAutofit/>
-          </a:bodyPr>
+        <p:spPr>
+          <a:xfrm>
+            <a:off x="4800602" y="731519"/>
+            <a:ext cx="6492240" cy="5728265"/>
+          </a:xfrm>
+        </p:spPr>
+        <p:txBody>
+          <a:bodyPr/>
           <a:lstStyle/>
           <a:p>
+            <a:pPr marL="0" indent="0">
+              <a:buNone/>
+            </a:pPr>
             <a:r>
               <a:rPr lang="en-US" sz="1800" dirty="0">
                 <a:solidFill>
                   <a:schemeClr val="tx1"/>
                 </a:solidFill>
               </a:rPr>
-              <a:t>Model Accuracy: 68%</a:t>
+              <a:t>This is a classification problem so we used following models to predict customer satisfaction:</a:t>
             </a:r>
           </a:p>
           <a:p>
@@ -7238,8 +6986,10 @@
                 <a:solidFill>
                   <a:schemeClr val="tx1"/>
                 </a:solidFill>
-              </a:rPr>
-              <a:t>Precision, Recall, and F1-Score for each class:</a:t>
+                <a:effectLst/>
+                <a:latin typeface="Helvetica" pitchFamily="2" charset="0"/>
+              </a:rPr>
+              <a:t>Logistic regression</a:t>
             </a:r>
           </a:p>
           <a:p>
@@ -7248,8 +6998,10 @@
                 <a:solidFill>
                   <a:schemeClr val="tx1"/>
                 </a:solidFill>
-              </a:rPr>
-              <a:t>Class 0 (Unsatisfied): Precision = 0.59, Recall = 0.48, F1-Score = 0.53</a:t>
+                <a:effectLst/>
+                <a:latin typeface="Helvetica" pitchFamily="2" charset="0"/>
+              </a:rPr>
+              <a:t>Decision tree classifier</a:t>
             </a:r>
           </a:p>
           <a:p>
@@ -7258,14 +7010,232 @@
                 <a:solidFill>
                   <a:schemeClr val="tx1"/>
                 </a:solidFill>
-              </a:rPr>
-              <a:t>Class 1 (Satisfied): Precision = 0.72, Recall = 0.80, F1-Score = 0.75</a:t>
-            </a:r>
-            <a:endParaRPr lang="en-US" sz="1800" dirty="0">
-              <a:solidFill>
-                <a:schemeClr val="tx1"/>
-              </a:solidFill>
-            </a:endParaRPr>
+                <a:effectLst/>
+                <a:latin typeface="Helvetica" pitchFamily="2" charset="0"/>
+              </a:rPr>
+              <a:t>Random forest classifier</a:t>
+            </a:r>
+          </a:p>
+          <a:p>
+            <a:r>
+              <a:rPr lang="en-IN" sz="1800" dirty="0">
+                <a:solidFill>
+                  <a:schemeClr val="tx1"/>
+                </a:solidFill>
+                <a:effectLst/>
+                <a:latin typeface="Helvetica" pitchFamily="2" charset="0"/>
+              </a:rPr>
+              <a:t>Gradient boosted classifier</a:t>
+            </a:r>
+          </a:p>
+          <a:p>
+            <a:pPr marL="0" indent="0">
+              <a:buNone/>
+            </a:pPr>
+            <a:r>
+              <a:rPr lang="en-US" sz="1800" dirty="0">
+                <a:solidFill>
+                  <a:schemeClr val="tx1"/>
+                </a:solidFill>
+              </a:rPr>
+              <a:t>Out of this </a:t>
+            </a:r>
+            <a:r>
+              <a:rPr lang="en-IN" sz="1800" b="1" dirty="0" err="1">
+                <a:solidFill>
+                  <a:schemeClr val="tx1"/>
+                </a:solidFill>
+              </a:rPr>
+              <a:t>HistGradientBoostingClassifier</a:t>
+            </a:r>
+            <a:r>
+              <a:rPr lang="en-IN" sz="1800" b="1" dirty="0">
+                <a:solidFill>
+                  <a:schemeClr val="tx1"/>
+                </a:solidFill>
+              </a:rPr>
+              <a:t> </a:t>
+            </a:r>
+            <a:r>
+              <a:rPr lang="en-IN" sz="1800" dirty="0">
+                <a:solidFill>
+                  <a:schemeClr val="tx1"/>
+                </a:solidFill>
+              </a:rPr>
+              <a:t>was used as it gave us better performance compared to other algorithms. The dataset was split into training and test sets (80%-20%).</a:t>
+            </a:r>
+          </a:p>
+          <a:p>
+            <a:pPr marL="0" indent="0">
+              <a:buNone/>
+            </a:pPr>
+            <a:r>
+              <a:rPr lang="en-IN" sz="1800" b="1" dirty="0" err="1">
+                <a:solidFill>
+                  <a:schemeClr val="tx1"/>
+                </a:solidFill>
+              </a:rPr>
+              <a:t>GridSearchCV</a:t>
+            </a:r>
+            <a:r>
+              <a:rPr lang="en-IN" sz="1800" dirty="0">
+                <a:solidFill>
+                  <a:schemeClr val="tx1"/>
+                </a:solidFill>
+              </a:rPr>
+              <a:t> was used for hyperparameter tuning with the following parameters:</a:t>
+            </a:r>
+          </a:p>
+          <a:p>
+            <a:pPr>
+              <a:lnSpc>
+                <a:spcPts val="1350"/>
+              </a:lnSpc>
+            </a:pPr>
+            <a:r>
+              <a:rPr lang="en-IN" sz="1800" b="0" dirty="0">
+                <a:solidFill>
+                  <a:schemeClr val="tx1"/>
+                </a:solidFill>
+                <a:effectLst/>
+                <a:latin typeface="Menlo" panose="020B0609030804020204" pitchFamily="49" charset="0"/>
+              </a:rPr>
+              <a:t>'</a:t>
+            </a:r>
+            <a:r>
+              <a:rPr lang="en-IN" sz="1800" b="0" dirty="0" err="1">
+                <a:solidFill>
+                  <a:schemeClr val="tx1"/>
+                </a:solidFill>
+                <a:effectLst/>
+                <a:latin typeface="Menlo" panose="020B0609030804020204" pitchFamily="49" charset="0"/>
+              </a:rPr>
+              <a:t>max_iter</a:t>
+            </a:r>
+            <a:r>
+              <a:rPr lang="en-IN" sz="1800" b="0" dirty="0">
+                <a:solidFill>
+                  <a:schemeClr val="tx1"/>
+                </a:solidFill>
+                <a:effectLst/>
+                <a:latin typeface="Menlo" panose="020B0609030804020204" pitchFamily="49" charset="0"/>
+              </a:rPr>
+              <a:t>': [100, 200, 300],</a:t>
+            </a:r>
+          </a:p>
+          <a:p>
+            <a:pPr>
+              <a:lnSpc>
+                <a:spcPts val="1350"/>
+              </a:lnSpc>
+            </a:pPr>
+            <a:r>
+              <a:rPr lang="en-IN" sz="1800" b="0" dirty="0">
+                <a:solidFill>
+                  <a:schemeClr val="tx1"/>
+                </a:solidFill>
+                <a:effectLst/>
+                <a:latin typeface="Menlo" panose="020B0609030804020204" pitchFamily="49" charset="0"/>
+              </a:rPr>
+              <a:t>'</a:t>
+            </a:r>
+            <a:r>
+              <a:rPr lang="en-IN" sz="1800" b="0" dirty="0" err="1">
+                <a:solidFill>
+                  <a:schemeClr val="tx1"/>
+                </a:solidFill>
+                <a:effectLst/>
+                <a:latin typeface="Menlo" panose="020B0609030804020204" pitchFamily="49" charset="0"/>
+              </a:rPr>
+              <a:t>max_depth</a:t>
+            </a:r>
+            <a:r>
+              <a:rPr lang="en-IN" sz="1800" b="0" dirty="0">
+                <a:solidFill>
+                  <a:schemeClr val="tx1"/>
+                </a:solidFill>
+                <a:effectLst/>
+                <a:latin typeface="Menlo" panose="020B0609030804020204" pitchFamily="49" charset="0"/>
+              </a:rPr>
+              <a:t>': [None, 3, 5],</a:t>
+            </a:r>
+          </a:p>
+          <a:p>
+            <a:pPr>
+              <a:lnSpc>
+                <a:spcPts val="1350"/>
+              </a:lnSpc>
+            </a:pPr>
+            <a:r>
+              <a:rPr lang="en-IN" sz="1800" b="0" dirty="0">
+                <a:solidFill>
+                  <a:schemeClr val="tx1"/>
+                </a:solidFill>
+                <a:effectLst/>
+                <a:latin typeface="Menlo" panose="020B0609030804020204" pitchFamily="49" charset="0"/>
+              </a:rPr>
+              <a:t>'</a:t>
+            </a:r>
+            <a:r>
+              <a:rPr lang="en-IN" sz="1800" b="0" dirty="0" err="1">
+                <a:solidFill>
+                  <a:schemeClr val="tx1"/>
+                </a:solidFill>
+                <a:effectLst/>
+                <a:latin typeface="Menlo" panose="020B0609030804020204" pitchFamily="49" charset="0"/>
+              </a:rPr>
+              <a:t>learning_rate</a:t>
+            </a:r>
+            <a:r>
+              <a:rPr lang="en-IN" sz="1800" b="0" dirty="0">
+                <a:solidFill>
+                  <a:schemeClr val="tx1"/>
+                </a:solidFill>
+                <a:effectLst/>
+                <a:latin typeface="Menlo" panose="020B0609030804020204" pitchFamily="49" charset="0"/>
+              </a:rPr>
+              <a:t>': [0.01, 0.1, 0.2],</a:t>
+            </a:r>
+          </a:p>
+          <a:p>
+            <a:pPr>
+              <a:lnSpc>
+                <a:spcPts val="1350"/>
+              </a:lnSpc>
+            </a:pPr>
+            <a:r>
+              <a:rPr lang="en-IN" sz="1800" b="0" dirty="0">
+                <a:solidFill>
+                  <a:schemeClr val="tx1"/>
+                </a:solidFill>
+                <a:effectLst/>
+                <a:latin typeface="Menlo" panose="020B0609030804020204" pitchFamily="49" charset="0"/>
+              </a:rPr>
+              <a:t>'</a:t>
+            </a:r>
+            <a:r>
+              <a:rPr lang="en-IN" sz="1800" b="0" dirty="0" err="1">
+                <a:solidFill>
+                  <a:schemeClr val="tx1"/>
+                </a:solidFill>
+                <a:effectLst/>
+                <a:latin typeface="Menlo" panose="020B0609030804020204" pitchFamily="49" charset="0"/>
+              </a:rPr>
+              <a:t>min_samples_leaf</a:t>
+            </a:r>
+            <a:r>
+              <a:rPr lang="en-IN" sz="1800" b="0" dirty="0">
+                <a:solidFill>
+                  <a:schemeClr val="tx1"/>
+                </a:solidFill>
+                <a:effectLst/>
+                <a:latin typeface="Menlo" panose="020B0609030804020204" pitchFamily="49" charset="0"/>
+              </a:rPr>
+              <a:t>': [10, 20, 30]</a:t>
+            </a:r>
+          </a:p>
+          <a:p>
+            <a:endParaRPr lang="en-IN" b="1" dirty="0"/>
           </a:p>
         </p:txBody>
       </p:sp>
@@ -7274,7 +7244,7 @@
           <p:cNvPr id="4" name="Text Placeholder 3">
             <a:extLst>
               <a:ext uri="{FF2B5EF4-FFF2-40B4-BE49-F238E27FC236}">
-                <a16:creationId xmlns:a16="http://schemas.microsoft.com/office/drawing/2014/main" id="{927BB01F-D686-495B-50B8-64B60F2E472F}"/>
+                <a16:creationId xmlns:a16="http://schemas.microsoft.com/office/drawing/2014/main" id="{C16AE560-1342-670A-C212-22E649C83E55}"/>
               </a:ext>
             </a:extLst>
           </p:cNvPr>
@@ -7299,7 +7269,7 @@
           <p:cNvPr id="5" name="Footer Placeholder 4">
             <a:extLst>
               <a:ext uri="{FF2B5EF4-FFF2-40B4-BE49-F238E27FC236}">
-                <a16:creationId xmlns:a16="http://schemas.microsoft.com/office/drawing/2014/main" id="{95F7544E-8E7C-67F4-165F-1DD195F518DC}"/>
+                <a16:creationId xmlns:a16="http://schemas.microsoft.com/office/drawing/2014/main" id="{DD5F15AA-0C5B-F22D-F82E-5B57F368B2D1}"/>
               </a:ext>
             </a:extLst>
           </p:cNvPr>
@@ -7328,7 +7298,7 @@
           <p:cNvPr id="6" name="Slide Number Placeholder 5">
             <a:extLst>
               <a:ext uri="{FF2B5EF4-FFF2-40B4-BE49-F238E27FC236}">
-                <a16:creationId xmlns:a16="http://schemas.microsoft.com/office/drawing/2014/main" id="{6E0B20B1-378A-B1A6-B319-E54050E0EBCE}"/>
+                <a16:creationId xmlns:a16="http://schemas.microsoft.com/office/drawing/2014/main" id="{93270C39-5227-8F72-675E-8ECBAD471268}"/>
               </a:ext>
             </a:extLst>
           </p:cNvPr>
@@ -7355,7 +7325,7 @@
     </p:spTree>
     <p:extLst>
       <p:ext uri="{BB962C8B-B14F-4D97-AF65-F5344CB8AC3E}">
-        <p14:creationId xmlns:p14="http://schemas.microsoft.com/office/powerpoint/2010/main" val="1758256232"/>
+        <p14:creationId xmlns:p14="http://schemas.microsoft.com/office/powerpoint/2010/main" val="2551012301"/>
       </p:ext>
     </p:extLst>
   </p:cSld>
@@ -7387,6 +7357,218 @@
           <p:cNvPr id="2" name="Title 1">
             <a:extLst>
               <a:ext uri="{FF2B5EF4-FFF2-40B4-BE49-F238E27FC236}">
+                <a16:creationId xmlns:a16="http://schemas.microsoft.com/office/drawing/2014/main" id="{47685888-ED76-7388-7A16-FB43ED69BC16}"/>
+              </a:ext>
+            </a:extLst>
+          </p:cNvPr>
+          <p:cNvSpPr>
+            <a:spLocks noGrp="1"/>
+          </p:cNvSpPr>
+          <p:nvPr>
+            <p:ph type="title"/>
+          </p:nvPr>
+        </p:nvSpPr>
+        <p:spPr/>
+        <p:txBody>
+          <a:bodyPr>
+            <a:normAutofit/>
+          </a:bodyPr>
+          <a:lstStyle/>
+          <a:p>
+            <a:r>
+              <a:rPr lang="en-US" sz="2800" b="1" dirty="0"/>
+              <a:t>Results</a:t>
+            </a:r>
+          </a:p>
+        </p:txBody>
+      </p:sp>
+      <p:sp>
+        <p:nvSpPr>
+          <p:cNvPr id="3" name="Content Placeholder 2">
+            <a:extLst>
+              <a:ext uri="{FF2B5EF4-FFF2-40B4-BE49-F238E27FC236}">
+                <a16:creationId xmlns:a16="http://schemas.microsoft.com/office/drawing/2014/main" id="{BA6CECB8-4AE5-4D2C-48CA-E5216457D569}"/>
+              </a:ext>
+            </a:extLst>
+          </p:cNvPr>
+          <p:cNvSpPr>
+            <a:spLocks noGrp="1"/>
+          </p:cNvSpPr>
+          <p:nvPr>
+            <p:ph idx="1"/>
+          </p:nvPr>
+        </p:nvSpPr>
+        <p:spPr/>
+        <p:txBody>
+          <a:bodyPr>
+            <a:normAutofit/>
+          </a:bodyPr>
+          <a:lstStyle/>
+          <a:p>
+            <a:r>
+              <a:rPr lang="en-US" sz="1800" dirty="0">
+                <a:solidFill>
+                  <a:schemeClr val="tx1"/>
+                </a:solidFill>
+              </a:rPr>
+              <a:t>Model Accuracy: 68%</a:t>
+            </a:r>
+          </a:p>
+          <a:p>
+            <a:r>
+              <a:rPr lang="en-IN" sz="1800" dirty="0">
+                <a:solidFill>
+                  <a:schemeClr val="tx1"/>
+                </a:solidFill>
+              </a:rPr>
+              <a:t>Precision, Recall, and F1-Score for each class:</a:t>
+            </a:r>
+          </a:p>
+          <a:p>
+            <a:r>
+              <a:rPr lang="en-IN" sz="1800" dirty="0">
+                <a:solidFill>
+                  <a:schemeClr val="tx1"/>
+                </a:solidFill>
+              </a:rPr>
+              <a:t>Class 0 (Unsatisfied): Precision = 0.59, Recall = 0.48, F1-Score = 0.53</a:t>
+            </a:r>
+          </a:p>
+          <a:p>
+            <a:r>
+              <a:rPr lang="en-IN" sz="1800" dirty="0">
+                <a:solidFill>
+                  <a:schemeClr val="tx1"/>
+                </a:solidFill>
+              </a:rPr>
+              <a:t>Class 1 (Satisfied): Precision = 0.72, Recall = 0.80, F1-Score = 0.75</a:t>
+            </a:r>
+            <a:endParaRPr lang="en-US" sz="1800" dirty="0">
+              <a:solidFill>
+                <a:schemeClr val="tx1"/>
+              </a:solidFill>
+            </a:endParaRPr>
+          </a:p>
+        </p:txBody>
+      </p:sp>
+      <p:sp>
+        <p:nvSpPr>
+          <p:cNvPr id="4" name="Text Placeholder 3">
+            <a:extLst>
+              <a:ext uri="{FF2B5EF4-FFF2-40B4-BE49-F238E27FC236}">
+                <a16:creationId xmlns:a16="http://schemas.microsoft.com/office/drawing/2014/main" id="{927BB01F-D686-495B-50B8-64B60F2E472F}"/>
+              </a:ext>
+            </a:extLst>
+          </p:cNvPr>
+          <p:cNvSpPr>
+            <a:spLocks noGrp="1"/>
+          </p:cNvSpPr>
+          <p:nvPr>
+            <p:ph type="body" sz="half" idx="2"/>
+          </p:nvPr>
+        </p:nvSpPr>
+        <p:spPr/>
+        <p:txBody>
+          <a:bodyPr/>
+          <a:lstStyle/>
+          <a:p>
+            <a:endParaRPr lang="en-US"/>
+          </a:p>
+        </p:txBody>
+      </p:sp>
+      <p:sp>
+        <p:nvSpPr>
+          <p:cNvPr id="5" name="Footer Placeholder 4">
+            <a:extLst>
+              <a:ext uri="{FF2B5EF4-FFF2-40B4-BE49-F238E27FC236}">
+                <a16:creationId xmlns:a16="http://schemas.microsoft.com/office/drawing/2014/main" id="{95F7544E-8E7C-67F4-165F-1DD195F518DC}"/>
+              </a:ext>
+            </a:extLst>
+          </p:cNvPr>
+          <p:cNvSpPr>
+            <a:spLocks noGrp="1"/>
+          </p:cNvSpPr>
+          <p:nvPr>
+            <p:ph type="ftr" sz="quarter" idx="11"/>
+          </p:nvPr>
+        </p:nvSpPr>
+        <p:spPr/>
+        <p:txBody>
+          <a:bodyPr/>
+          <a:lstStyle/>
+          <a:p>
+            <a:r>
+              <a:rPr lang="it-IT"/>
+              <a:t>DA 204o: Data Science in Practice</a:t>
+            </a:r>
+            <a:endParaRPr lang="en-SG"/>
+          </a:p>
+        </p:txBody>
+      </p:sp>
+      <p:sp>
+        <p:nvSpPr>
+          <p:cNvPr id="6" name="Slide Number Placeholder 5">
+            <a:extLst>
+              <a:ext uri="{FF2B5EF4-FFF2-40B4-BE49-F238E27FC236}">
+                <a16:creationId xmlns:a16="http://schemas.microsoft.com/office/drawing/2014/main" id="{6E0B20B1-378A-B1A6-B319-E54050E0EBCE}"/>
+              </a:ext>
+            </a:extLst>
+          </p:cNvPr>
+          <p:cNvSpPr>
+            <a:spLocks noGrp="1"/>
+          </p:cNvSpPr>
+          <p:nvPr>
+            <p:ph type="sldNum" sz="quarter" idx="12"/>
+          </p:nvPr>
+        </p:nvSpPr>
+        <p:spPr/>
+        <p:txBody>
+          <a:bodyPr/>
+          <a:lstStyle/>
+          <a:p>
+            <a:fld id="{BF1758FF-0BF1-4103-A89A-38EC40E85429}" type="slidenum">
+              <a:rPr lang="en-SG" smtClean="0"/>
+              <a:t>16</a:t>
+            </a:fld>
+            <a:endParaRPr lang="en-SG"/>
+          </a:p>
+        </p:txBody>
+      </p:sp>
+    </p:spTree>
+    <p:extLst>
+      <p:ext uri="{BB962C8B-B14F-4D97-AF65-F5344CB8AC3E}">
+        <p14:creationId xmlns:p14="http://schemas.microsoft.com/office/powerpoint/2010/main" val="1758256232"/>
+      </p:ext>
+    </p:extLst>
+  </p:cSld>
+  <p:clrMapOvr>
+    <a:masterClrMapping/>
+  </p:clrMapOvr>
+</p:sld>
+</file>
+
+<file path=ppt/slides/slide17.xml><?xml version="1.0" encoding="utf-8"?>
+<p:sld xmlns:a="http://schemas.openxmlformats.org/drawingml/2006/main" xmlns:r="http://schemas.openxmlformats.org/officeDocument/2006/relationships" xmlns:p="http://schemas.openxmlformats.org/presentationml/2006/main">
+  <p:cSld>
+    <p:spTree>
+      <p:nvGrpSpPr>
+        <p:cNvPr id="1" name=""/>
+        <p:cNvGrpSpPr/>
+        <p:nvPr/>
+      </p:nvGrpSpPr>
+      <p:grpSpPr>
+        <a:xfrm>
+          <a:off x="0" y="0"/>
+          <a:ext cx="0" cy="0"/>
+          <a:chOff x="0" y="0"/>
+          <a:chExt cx="0" cy="0"/>
+        </a:xfrm>
+      </p:grpSpPr>
+      <p:sp>
+        <p:nvSpPr>
+          <p:cNvPr id="2" name="Title 1">
+            <a:extLst>
+              <a:ext uri="{FF2B5EF4-FFF2-40B4-BE49-F238E27FC236}">
                 <a16:creationId xmlns:a16="http://schemas.microsoft.com/office/drawing/2014/main" id="{A6D7407D-AC7F-2E01-ED27-BF7361EE4D6E}"/>
               </a:ext>
             </a:extLst>
@@ -7623,7 +7805,7 @@
           <a:p>
             <a:fld id="{BF1758FF-0BF1-4103-A89A-38EC40E85429}" type="slidenum">
               <a:rPr lang="en-SG" smtClean="0"/>
-              <a:t>16</a:t>
+              <a:t>17</a:t>
             </a:fld>
             <a:endParaRPr lang="en-SG"/>
           </a:p>
@@ -8083,7 +8265,7 @@
                 <a:ea typeface="Aptos" panose="020B0004020202020204" pitchFamily="34" charset="0"/>
                 <a:cs typeface="Times New Roman" panose="02020603050405020304" pitchFamily="18" charset="0"/>
               </a:rPr>
-              <a:t>Github</a:t>
+              <a:t>kaggle</a:t>
             </a:r>
             <a:r>
               <a:rPr lang="en-US" sz="1800" kern="100" dirty="0">
@@ -8092,7 +8274,26 @@
                 <a:ea typeface="Aptos" panose="020B0004020202020204" pitchFamily="34" charset="0"/>
                 <a:cs typeface="Times New Roman" panose="02020603050405020304" pitchFamily="18" charset="0"/>
               </a:rPr>
-              <a:t>.</a:t>
+              <a:t>.(</a:t>
+            </a:r>
+            <a:r>
+              <a:rPr lang="en-US" sz="1800" kern="100" dirty="0">
+                <a:effectLst/>
+                <a:latin typeface="Aptos" panose="020B0004020202020204" pitchFamily="34" charset="0"/>
+                <a:ea typeface="Aptos" panose="020B0004020202020204" pitchFamily="34" charset="0"/>
+                <a:cs typeface="Times New Roman" panose="02020603050405020304" pitchFamily="18" charset="0"/>
+                <a:hlinkClick r:id="rId2"/>
+              </a:rPr>
+              <a:t>Dataset</a:t>
+            </a:r>
+            <a:r>
+              <a:rPr lang="en-US" sz="1800" kern="100" dirty="0">
+                <a:effectLst/>
+                <a:latin typeface="Aptos" panose="020B0004020202020204" pitchFamily="34" charset="0"/>
+                <a:ea typeface="Aptos" panose="020B0004020202020204" pitchFamily="34" charset="0"/>
+                <a:cs typeface="Times New Roman" panose="02020603050405020304" pitchFamily="18" charset="0"/>
+              </a:rPr>
+              <a:t>)</a:t>
             </a:r>
           </a:p>
           <a:p>
@@ -8467,7 +8668,7 @@
                   <a:schemeClr val="accent2"/>
                 </a:solidFill>
               </a:rPr>
-              <a:t>Overview of methods or models you plan to use:</a:t>
+              <a:t>Overview of methods or models used:</a:t>
             </a:r>
           </a:p>
           <a:p>
@@ -9253,12 +9454,23 @@
             </a:r>
           </a:p>
           <a:p>
+            <a:pPr lvl="1"/>
             <a:r>
               <a:rPr lang="en-US" dirty="0">
                 <a:solidFill>
                   <a:schemeClr val="tx1"/>
                 </a:solidFill>
               </a:rPr>
+              <a:t>Imbalance in classes</a:t>
+            </a:r>
+          </a:p>
+          <a:p>
+            <a:r>
+              <a:rPr lang="en-US" dirty="0">
+                <a:solidFill>
+                  <a:schemeClr val="tx1"/>
+                </a:solidFill>
+              </a:rPr>
               <a:t>How you plan to mitigate them</a:t>
             </a:r>
           </a:p>
@@ -9270,7 +9482,7 @@
                   <a:schemeClr val="tx1"/>
                 </a:solidFill>
               </a:rPr>
-              <a:t>By correlating the features with target variable.</a:t>
+              <a:t>By correlating the features with target variable</a:t>
             </a:r>
           </a:p>
         </p:txBody>

</xml_diff>